<commit_message>
Feat : create chapter5 code.
</commit_message>
<xml_diff>
--- a/보고서 자동화 프로젝트/test.pptx
+++ b/보고서 자동화 프로젝트/test.pptx
@@ -3104,89 +3104,38 @@
           <a:lstStyle/>
           <a:p>
             <a:r>
-              <a:t>Adding a Table</a:t>
-            </a:r>
-          </a:p>
-        </p:txBody>
-      </p:sp>
-      <p:graphicFrame>
-        <p:nvGraphicFramePr>
-          <p:cNvPr id="3" name="Table 2"/>
-          <p:cNvGraphicFramePr>
-            <a:graphicFrameLocks noGrp="1"/>
-          </p:cNvGraphicFramePr>
-          <p:nvPr/>
-        </p:nvGraphicFramePr>
-        <p:xfrm>
-          <a:off x="1828800" y="1828800"/>
-          <a:ext cx="5486400" cy="731520"/>
-        </p:xfrm>
-        <a:graphic>
-          <a:graphicData uri="http://schemas.openxmlformats.org/drawingml/2006/table">
-            <a:tbl>
-              <a:tblPr firstRow="1" bandRow="1">
-                <a:tableStyleId>{5C22544A-7EE6-4342-B048-85BDC9FD1C3A}</a:tableStyleId>
-              </a:tblPr>
-              <a:tblGrid>
-                <a:gridCol w="1828800"/>
-                <a:gridCol w="3657600"/>
-              </a:tblGrid>
-              <a:tr h="365760">
-                <a:tc>
-                  <a:txBody>
-                    <a:bodyPr/>
-                    <a:lstStyle/>
-                    <a:p>
-                      <a:r>
-                        <a:t>Foo</a:t>
-                      </a:r>
-                    </a:p>
-                  </a:txBody>
-                  <a:tcPr/>
-                </a:tc>
-                <a:tc>
-                  <a:txBody>
-                    <a:bodyPr/>
-                    <a:lstStyle/>
-                    <a:p>
-                      <a:r>
-                        <a:t>Bar</a:t>
-                      </a:r>
-                    </a:p>
-                  </a:txBody>
-                  <a:tcPr/>
-                </a:tc>
-              </a:tr>
-              <a:tr h="365760">
-                <a:tc>
-                  <a:txBody>
-                    <a:bodyPr/>
-                    <a:lstStyle/>
-                    <a:p>
-                      <a:r>
-                        <a:t>Baz</a:t>
-                      </a:r>
-                    </a:p>
-                  </a:txBody>
-                  <a:tcPr/>
-                </a:tc>
-                <a:tc>
-                  <a:txBody>
-                    <a:bodyPr/>
-                    <a:lstStyle/>
-                    <a:p>
-                      <a:r>
-                        <a:t>Qux</a:t>
-                      </a:r>
-                    </a:p>
-                  </a:txBody>
-                  <a:tcPr/>
-                </a:tc>
-              </a:tr>
-            </a:tbl>
-          </a:graphicData>
-        </a:graphic>
-      </p:graphicFrame>
+              <a:t>Adding a Bullet Slide</a:t>
+            </a:r>
+          </a:p>
+        </p:txBody>
+      </p:sp>
+      <p:sp>
+        <p:nvSpPr>
+          <p:cNvPr id="3" name="Content Placeholder 2"/>
+          <p:cNvSpPr>
+            <a:spLocks noGrp="1"/>
+          </p:cNvSpPr>
+          <p:nvPr>
+            <p:ph idx="1"/>
+          </p:nvPr>
+        </p:nvSpPr>
+        <p:spPr/>
+        <p:txBody>
+          <a:bodyPr/>
+          <a:lstStyle/>
+          <a:p>
+            <a:r>
+              <a:t>Find the bullet slide layout</a:t>
+            </a:r>
+          </a:p>
+          <a:p>
+            <a:pPr lvl="2"/>
+            <a:r>
+              <a:t>Use _TextFrame.add_paragraph() for subsequent bullets</a:t>
+            </a:r>
+          </a:p>
+        </p:txBody>
+      </p:sp>
     </p:spTree>
   </p:cSld>
   <p:clrMapOvr>

</xml_diff>